<commit_message>
more small image fixes
</commit_message>
<xml_diff>
--- a/images/some_images.pptx
+++ b/images/some_images.pptx
@@ -6,6 +6,9 @@
   </p:sldMasterIdLst>
   <p:sldIdLst>
     <p:sldId id="256" r:id="rId2"/>
+    <p:sldId id="257" r:id="rId3"/>
+    <p:sldId id="258" r:id="rId4"/>
+    <p:sldId id="259" r:id="rId5"/>
   </p:sldIdLst>
   <p:sldSz cx="12192000" cy="6858000"/>
   <p:notesSz cx="6858000" cy="9144000"/>
@@ -3436,6 +3439,329 @@
 </p:sld>
 </file>
 
+<file path=ppt/slides/slide2.xml><?xml version="1.0" encoding="utf-8"?>
+<p:sld xmlns:a="http://schemas.openxmlformats.org/drawingml/2006/main" xmlns:r="http://schemas.openxmlformats.org/officeDocument/2006/relationships" xmlns:p="http://schemas.openxmlformats.org/presentationml/2006/main">
+  <p:cSld>
+    <p:spTree>
+      <p:nvGrpSpPr>
+        <p:cNvPr id="1" name=""/>
+        <p:cNvGrpSpPr/>
+        <p:nvPr/>
+      </p:nvGrpSpPr>
+      <p:grpSpPr>
+        <a:xfrm>
+          <a:off x="0" y="0"/>
+          <a:ext cx="0" cy="0"/>
+          <a:chOff x="0" y="0"/>
+          <a:chExt cx="0" cy="0"/>
+        </a:xfrm>
+      </p:grpSpPr>
+      <p:grpSp>
+        <p:nvGrpSpPr>
+          <p:cNvPr id="11" name="Group 10">
+            <a:extLst>
+              <a:ext uri="{FF2B5EF4-FFF2-40B4-BE49-F238E27FC236}">
+                <a16:creationId xmlns:a16="http://schemas.microsoft.com/office/drawing/2014/main" id="{9265319A-2314-DCCA-35C9-3E0799ECBA52}"/>
+              </a:ext>
+            </a:extLst>
+          </p:cNvPr>
+          <p:cNvGrpSpPr/>
+          <p:nvPr/>
+        </p:nvGrpSpPr>
+        <p:grpSpPr>
+          <a:xfrm>
+            <a:off x="2455101" y="1312255"/>
+            <a:ext cx="8204548" cy="4659863"/>
+            <a:chOff x="2455101" y="1312255"/>
+            <a:chExt cx="8204548" cy="4659863"/>
+          </a:xfrm>
+        </p:grpSpPr>
+        <p:sp>
+          <p:nvSpPr>
+            <p:cNvPr id="6" name="Rectangle 5">
+              <a:extLst>
+                <a:ext uri="{FF2B5EF4-FFF2-40B4-BE49-F238E27FC236}">
+                  <a16:creationId xmlns:a16="http://schemas.microsoft.com/office/drawing/2014/main" id="{DFBD5AA1-1C6A-78D1-D8A3-1165A4C76D95}"/>
+                </a:ext>
+              </a:extLst>
+            </p:cNvPr>
+            <p:cNvSpPr/>
+            <p:nvPr/>
+          </p:nvSpPr>
+          <p:spPr>
+            <a:xfrm>
+              <a:off x="2455102" y="1312255"/>
+              <a:ext cx="8204547" cy="4659863"/>
+            </a:xfrm>
+            <a:prstGeom prst="rect">
+              <a:avLst/>
+            </a:prstGeom>
+            <a:solidFill>
+              <a:schemeClr val="bg1"/>
+            </a:solidFill>
+            <a:ln>
+              <a:noFill/>
+            </a:ln>
+          </p:spPr>
+          <p:style>
+            <a:lnRef idx="2">
+              <a:schemeClr val="accent1">
+                <a:shade val="15000"/>
+              </a:schemeClr>
+            </a:lnRef>
+            <a:fillRef idx="1">
+              <a:schemeClr val="accent1"/>
+            </a:fillRef>
+            <a:effectRef idx="0">
+              <a:schemeClr val="accent1"/>
+            </a:effectRef>
+            <a:fontRef idx="minor">
+              <a:schemeClr val="lt1"/>
+            </a:fontRef>
+          </p:style>
+          <p:txBody>
+            <a:bodyPr rtlCol="0" anchor="ctr"/>
+            <a:lstStyle/>
+            <a:p>
+              <a:pPr algn="ctr"/>
+              <a:endParaRPr lang="en-US"/>
+            </a:p>
+          </p:txBody>
+        </p:sp>
+        <p:pic>
+          <p:nvPicPr>
+            <p:cNvPr id="10" name="Content Placeholder 4" descr="A diagram of a number&#10;&#10;Description automatically generated">
+              <a:extLst>
+                <a:ext uri="{FF2B5EF4-FFF2-40B4-BE49-F238E27FC236}">
+                  <a16:creationId xmlns:a16="http://schemas.microsoft.com/office/drawing/2014/main" id="{B40D5E5E-7A17-F6B0-524F-9E2540F1C76C}"/>
+                </a:ext>
+              </a:extLst>
+            </p:cNvPr>
+            <p:cNvPicPr>
+              <a:picLocks noChangeAspect="1"/>
+            </p:cNvPicPr>
+            <p:nvPr/>
+          </p:nvPicPr>
+          <p:blipFill rotWithShape="1">
+            <a:blip r:embed="rId2"/>
+            <a:srcRect l="35472" t="30874" r="35378" b="35445"/>
+            <a:stretch/>
+          </p:blipFill>
+          <p:spPr>
+            <a:xfrm>
+              <a:off x="2455101" y="1312255"/>
+              <a:ext cx="8204548" cy="4659863"/>
+            </a:xfrm>
+            <a:prstGeom prst="rect">
+              <a:avLst/>
+            </a:prstGeom>
+          </p:spPr>
+        </p:pic>
+      </p:grpSp>
+    </p:spTree>
+    <p:extLst>
+      <p:ext uri="{BB962C8B-B14F-4D97-AF65-F5344CB8AC3E}">
+        <p14:creationId xmlns:p14="http://schemas.microsoft.com/office/powerpoint/2010/main" val="3541050821"/>
+      </p:ext>
+    </p:extLst>
+  </p:cSld>
+  <p:clrMapOvr>
+    <a:masterClrMapping/>
+  </p:clrMapOvr>
+</p:sld>
+</file>
+
+<file path=ppt/slides/slide3.xml><?xml version="1.0" encoding="utf-8"?>
+<p:sld xmlns:a="http://schemas.openxmlformats.org/drawingml/2006/main" xmlns:r="http://schemas.openxmlformats.org/officeDocument/2006/relationships" xmlns:p="http://schemas.openxmlformats.org/presentationml/2006/main">
+  <p:cSld>
+    <p:spTree>
+      <p:nvGrpSpPr>
+        <p:cNvPr id="1" name=""/>
+        <p:cNvGrpSpPr/>
+        <p:nvPr/>
+      </p:nvGrpSpPr>
+      <p:grpSpPr>
+        <a:xfrm>
+          <a:off x="0" y="0"/>
+          <a:ext cx="0" cy="0"/>
+          <a:chOff x="0" y="0"/>
+          <a:chExt cx="0" cy="0"/>
+        </a:xfrm>
+      </p:grpSpPr>
+      <p:pic>
+        <p:nvPicPr>
+          <p:cNvPr id="13" name="Content Placeholder 4" descr="A screenshot of a computer&#10;&#10;Description automatically generated">
+            <a:extLst>
+              <a:ext uri="{FF2B5EF4-FFF2-40B4-BE49-F238E27FC236}">
+                <a16:creationId xmlns:a16="http://schemas.microsoft.com/office/drawing/2014/main" id="{0EF769C0-2CD4-86D5-FDF5-B5A9DF5464EC}"/>
+              </a:ext>
+            </a:extLst>
+          </p:cNvPr>
+          <p:cNvPicPr>
+            <a:picLocks noChangeAspect="1"/>
+          </p:cNvPicPr>
+          <p:nvPr/>
+        </p:nvPicPr>
+        <p:blipFill rotWithShape="1">
+          <a:blip r:embed="rId2"/>
+          <a:srcRect l="37357" t="32891" r="37233" b="36646"/>
+          <a:stretch/>
+        </p:blipFill>
+        <p:spPr>
+          <a:xfrm>
+            <a:off x="2542784" y="1239183"/>
+            <a:ext cx="7002049" cy="5448450"/>
+          </a:xfrm>
+          <a:prstGeom prst="rect">
+            <a:avLst/>
+          </a:prstGeom>
+        </p:spPr>
+      </p:pic>
+    </p:spTree>
+    <p:extLst>
+      <p:ext uri="{BB962C8B-B14F-4D97-AF65-F5344CB8AC3E}">
+        <p14:creationId xmlns:p14="http://schemas.microsoft.com/office/powerpoint/2010/main" val="1974792377"/>
+      </p:ext>
+    </p:extLst>
+  </p:cSld>
+  <p:clrMapOvr>
+    <a:masterClrMapping/>
+  </p:clrMapOvr>
+</p:sld>
+</file>
+
+<file path=ppt/slides/slide4.xml><?xml version="1.0" encoding="utf-8"?>
+<p:sld xmlns:a="http://schemas.openxmlformats.org/drawingml/2006/main" xmlns:r="http://schemas.openxmlformats.org/officeDocument/2006/relationships" xmlns:p="http://schemas.openxmlformats.org/presentationml/2006/main">
+  <p:cSld>
+    <p:spTree>
+      <p:nvGrpSpPr>
+        <p:cNvPr id="1" name=""/>
+        <p:cNvGrpSpPr/>
+        <p:nvPr/>
+      </p:nvGrpSpPr>
+      <p:grpSpPr>
+        <a:xfrm>
+          <a:off x="0" y="0"/>
+          <a:ext cx="0" cy="0"/>
+          <a:chOff x="0" y="0"/>
+          <a:chExt cx="0" cy="0"/>
+        </a:xfrm>
+      </p:grpSpPr>
+      <p:grpSp>
+        <p:nvGrpSpPr>
+          <p:cNvPr id="13" name="Group 12">
+            <a:extLst>
+              <a:ext uri="{FF2B5EF4-FFF2-40B4-BE49-F238E27FC236}">
+                <a16:creationId xmlns:a16="http://schemas.microsoft.com/office/drawing/2014/main" id="{D2E00C2B-9FF5-3472-7DAD-40EA1EEB32AC}"/>
+              </a:ext>
+            </a:extLst>
+          </p:cNvPr>
+          <p:cNvGrpSpPr/>
+          <p:nvPr/>
+        </p:nvGrpSpPr>
+        <p:grpSpPr>
+          <a:xfrm>
+            <a:off x="2680569" y="1585582"/>
+            <a:ext cx="6501009" cy="4714002"/>
+            <a:chOff x="2680569" y="1585582"/>
+            <a:chExt cx="6501009" cy="4714002"/>
+          </a:xfrm>
+        </p:grpSpPr>
+        <p:sp>
+          <p:nvSpPr>
+            <p:cNvPr id="6" name="Rectangle 5">
+              <a:extLst>
+                <a:ext uri="{FF2B5EF4-FFF2-40B4-BE49-F238E27FC236}">
+                  <a16:creationId xmlns:a16="http://schemas.microsoft.com/office/drawing/2014/main" id="{96C2A63E-A149-1423-A7D3-F5D09FAA3140}"/>
+                </a:ext>
+              </a:extLst>
+            </p:cNvPr>
+            <p:cNvSpPr/>
+            <p:nvPr/>
+          </p:nvSpPr>
+          <p:spPr>
+            <a:xfrm>
+              <a:off x="2680569" y="1585582"/>
+              <a:ext cx="6501007" cy="4714002"/>
+            </a:xfrm>
+            <a:prstGeom prst="rect">
+              <a:avLst/>
+            </a:prstGeom>
+            <a:solidFill>
+              <a:schemeClr val="bg1"/>
+            </a:solidFill>
+            <a:ln>
+              <a:noFill/>
+            </a:ln>
+          </p:spPr>
+          <p:style>
+            <a:lnRef idx="2">
+              <a:schemeClr val="accent1">
+                <a:shade val="15000"/>
+              </a:schemeClr>
+            </a:lnRef>
+            <a:fillRef idx="1">
+              <a:schemeClr val="accent1"/>
+            </a:fillRef>
+            <a:effectRef idx="0">
+              <a:schemeClr val="accent1"/>
+            </a:effectRef>
+            <a:fontRef idx="minor">
+              <a:schemeClr val="lt1"/>
+            </a:fontRef>
+          </p:style>
+          <p:txBody>
+            <a:bodyPr rtlCol="0" anchor="ctr"/>
+            <a:lstStyle/>
+            <a:p>
+              <a:pPr algn="ctr"/>
+              <a:endParaRPr lang="en-US"/>
+            </a:p>
+          </p:txBody>
+        </p:sp>
+        <p:pic>
+          <p:nvPicPr>
+            <p:cNvPr id="12" name="Content Placeholder 4" descr="A blue and yellow object with a ladder&#10;&#10;Description automatically generated">
+              <a:extLst>
+                <a:ext uri="{FF2B5EF4-FFF2-40B4-BE49-F238E27FC236}">
+                  <a16:creationId xmlns:a16="http://schemas.microsoft.com/office/drawing/2014/main" id="{7B5B25B4-39E0-1376-62E1-B1A49DBB9F02}"/>
+                </a:ext>
+              </a:extLst>
+            </p:cNvPr>
+            <p:cNvPicPr>
+              <a:picLocks noChangeAspect="1"/>
+            </p:cNvPicPr>
+            <p:nvPr/>
+          </p:nvPicPr>
+          <p:blipFill rotWithShape="1">
+            <a:blip r:embed="rId2"/>
+            <a:srcRect l="37056" t="23149" r="37810" b="30399"/>
+            <a:stretch/>
+          </p:blipFill>
+          <p:spPr>
+            <a:xfrm>
+              <a:off x="2680570" y="1585582"/>
+              <a:ext cx="6501008" cy="4714002"/>
+            </a:xfrm>
+            <a:prstGeom prst="rect">
+              <a:avLst/>
+            </a:prstGeom>
+          </p:spPr>
+        </p:pic>
+      </p:grpSp>
+    </p:spTree>
+    <p:extLst>
+      <p:ext uri="{BB962C8B-B14F-4D97-AF65-F5344CB8AC3E}">
+        <p14:creationId xmlns:p14="http://schemas.microsoft.com/office/powerpoint/2010/main" val="1900889553"/>
+      </p:ext>
+    </p:extLst>
+  </p:cSld>
+  <p:clrMapOvr>
+    <a:masterClrMapping/>
+  </p:clrMapOvr>
+</p:sld>
+</file>
+
 <file path=ppt/theme/theme1.xml><?xml version="1.0" encoding="utf-8"?>
 <a:theme xmlns:a="http://schemas.openxmlformats.org/drawingml/2006/main" name="Office Theme">
   <a:themeElements>

</xml_diff>